<commit_message>
Code tidy up and readme updated
</commit_message>
<xml_diff>
--- a/Presentation.pptx
+++ b/Presentation.pptx
@@ -8,6 +8,7 @@
     <p:sldId id="256" r:id="rId2"/>
     <p:sldId id="257" r:id="rId3"/>
     <p:sldId id="258" r:id="rId4"/>
+    <p:sldId id="259" r:id="rId5"/>
   </p:sldIdLst>
   <p:sldSz cx="12192000" cy="6858000"/>
   <p:notesSz cx="6858000" cy="9144000"/>
@@ -106,13 +107,18 @@
       </a:defRPr>
     </a:lvl9pPr>
   </p:defaultTextStyle>
+  <p:extLst>
+    <p:ext uri="{EFAFB233-063F-42B5-8137-9DF3F51BA10A}">
+      <p15:sldGuideLst xmlns:p15="http://schemas.microsoft.com/office/powerpoint/2012/main"/>
+    </p:ext>
+  </p:extLst>
 </p:presentation>
 </file>
 
 <file path=ppt/revisionInfo.xml><?xml version="1.0" encoding="utf-8"?>
 <p1510:revInfo xmlns:a="http://schemas.openxmlformats.org/drawingml/2006/main" xmlns:r="http://schemas.openxmlformats.org/officeDocument/2006/relationships" xmlns:p1510="http://schemas.microsoft.com/office/powerpoint/2015/10/main">
   <p1510:revLst>
-    <p1510:client id="{2B7489F4-EC35-4C72-BD38-7F67414C3088}" v="17" dt="2020-12-04T18:36:24.900"/>
+    <p1510:client id="{174DD396-4FC5-494D-B5F1-61C6B2F65D98}" v="6" dt="2021-01-03T23:47:42.339"/>
   </p1510:revLst>
 </p1510:revInfo>
 </file>
@@ -954,6 +960,180 @@
           <pc:docMk/>
           <pc:sldMk cId="815180451" sldId="258"/>
         </pc:sldMkLst>
+      </pc:sldChg>
+    </pc:docChg>
+  </pc:docChgLst>
+  <pc:docChgLst>
+    <pc:chgData name="Sheamus Clifford" userId="6289db22-700b-4bb7-828b-b7aee3de489c" providerId="ADAL" clId="{174DD396-4FC5-494D-B5F1-61C6B2F65D98}"/>
+    <pc:docChg chg="undo custSel mod addSld modSld">
+      <pc:chgData name="Sheamus Clifford" userId="6289db22-700b-4bb7-828b-b7aee3de489c" providerId="ADAL" clId="{174DD396-4FC5-494D-B5F1-61C6B2F65D98}" dt="2021-01-04T00:11:03.140" v="1921" actId="14100"/>
+      <pc:docMkLst>
+        <pc:docMk/>
+      </pc:docMkLst>
+      <pc:sldChg chg="addSp modSp mod">
+        <pc:chgData name="Sheamus Clifford" userId="6289db22-700b-4bb7-828b-b7aee3de489c" providerId="ADAL" clId="{174DD396-4FC5-494D-B5F1-61C6B2F65D98}" dt="2021-01-03T23:42:35.711" v="47" actId="20577"/>
+        <pc:sldMkLst>
+          <pc:docMk/>
+          <pc:sldMk cId="6080015" sldId="256"/>
+        </pc:sldMkLst>
+        <pc:spChg chg="add mod">
+          <ac:chgData name="Sheamus Clifford" userId="6289db22-700b-4bb7-828b-b7aee3de489c" providerId="ADAL" clId="{174DD396-4FC5-494D-B5F1-61C6B2F65D98}" dt="2021-01-03T23:41:18.038" v="13" actId="1076"/>
+          <ac:spMkLst>
+            <pc:docMk/>
+            <pc:sldMk cId="6080015" sldId="256"/>
+            <ac:spMk id="3" creationId="{B14197F2-E74F-4C0E-A3AF-45465A33C958}"/>
+          </ac:spMkLst>
+        </pc:spChg>
+        <pc:spChg chg="add mod">
+          <ac:chgData name="Sheamus Clifford" userId="6289db22-700b-4bb7-828b-b7aee3de489c" providerId="ADAL" clId="{174DD396-4FC5-494D-B5F1-61C6B2F65D98}" dt="2021-01-03T23:41:35.110" v="15" actId="1076"/>
+          <ac:spMkLst>
+            <pc:docMk/>
+            <pc:sldMk cId="6080015" sldId="256"/>
+            <ac:spMk id="39" creationId="{9AA30EB3-AB26-423D-BFA8-5E91A1F18074}"/>
+          </ac:spMkLst>
+        </pc:spChg>
+        <pc:spChg chg="add mod">
+          <ac:chgData name="Sheamus Clifford" userId="6289db22-700b-4bb7-828b-b7aee3de489c" providerId="ADAL" clId="{174DD396-4FC5-494D-B5F1-61C6B2F65D98}" dt="2021-01-03T23:42:18.957" v="38" actId="1076"/>
+          <ac:spMkLst>
+            <pc:docMk/>
+            <pc:sldMk cId="6080015" sldId="256"/>
+            <ac:spMk id="41" creationId="{2F7417B8-FEBE-4A32-8EF6-CCC2CC438B16}"/>
+          </ac:spMkLst>
+        </pc:spChg>
+        <pc:spChg chg="add mod">
+          <ac:chgData name="Sheamus Clifford" userId="6289db22-700b-4bb7-828b-b7aee3de489c" providerId="ADAL" clId="{174DD396-4FC5-494D-B5F1-61C6B2F65D98}" dt="2021-01-03T23:42:35.711" v="47" actId="20577"/>
+          <ac:spMkLst>
+            <pc:docMk/>
+            <pc:sldMk cId="6080015" sldId="256"/>
+            <ac:spMk id="42" creationId="{11782927-49BB-41A8-8277-319E76C972F5}"/>
+          </ac:spMkLst>
+        </pc:spChg>
+      </pc:sldChg>
+      <pc:sldChg chg="addSp delSp modSp mod setBg modClrScheme delDesignElem chgLayout">
+        <pc:chgData name="Sheamus Clifford" userId="6289db22-700b-4bb7-828b-b7aee3de489c" providerId="ADAL" clId="{174DD396-4FC5-494D-B5F1-61C6B2F65D98}" dt="2021-01-04T00:11:03.140" v="1921" actId="14100"/>
+        <pc:sldMkLst>
+          <pc:docMk/>
+          <pc:sldMk cId="815180451" sldId="258"/>
+        </pc:sldMkLst>
+        <pc:spChg chg="add del mod ord">
+          <ac:chgData name="Sheamus Clifford" userId="6289db22-700b-4bb7-828b-b7aee3de489c" providerId="ADAL" clId="{174DD396-4FC5-494D-B5F1-61C6B2F65D98}" dt="2021-01-03T23:45:04.958" v="62" actId="478"/>
+          <ac:spMkLst>
+            <pc:docMk/>
+            <pc:sldMk cId="815180451" sldId="258"/>
+            <ac:spMk id="4" creationId="{ACE66122-6D36-4717-8227-717FF2FF5E39}"/>
+          </ac:spMkLst>
+        </pc:spChg>
+        <pc:spChg chg="add mod">
+          <ac:chgData name="Sheamus Clifford" userId="6289db22-700b-4bb7-828b-b7aee3de489c" providerId="ADAL" clId="{174DD396-4FC5-494D-B5F1-61C6B2F65D98}" dt="2021-01-03T23:47:01.325" v="142" actId="20577"/>
+          <ac:spMkLst>
+            <pc:docMk/>
+            <pc:sldMk cId="815180451" sldId="258"/>
+            <ac:spMk id="5" creationId="{83D44ECC-0ACB-45BE-A674-A70550987B71}"/>
+          </ac:spMkLst>
+        </pc:spChg>
+        <pc:spChg chg="add del">
+          <ac:chgData name="Sheamus Clifford" userId="6289db22-700b-4bb7-828b-b7aee3de489c" providerId="ADAL" clId="{174DD396-4FC5-494D-B5F1-61C6B2F65D98}" dt="2021-01-03T23:43:41.569" v="48" actId="700"/>
+          <ac:spMkLst>
+            <pc:docMk/>
+            <pc:sldMk cId="815180451" sldId="258"/>
+            <ac:spMk id="8" creationId="{41497DE5-0939-4D1D-9350-0C5E1B209C68}"/>
+          </ac:spMkLst>
+        </pc:spChg>
+        <pc:spChg chg="add del">
+          <ac:chgData name="Sheamus Clifford" userId="6289db22-700b-4bb7-828b-b7aee3de489c" providerId="ADAL" clId="{174DD396-4FC5-494D-B5F1-61C6B2F65D98}" dt="2021-01-03T23:45:14.967" v="63" actId="700"/>
+          <ac:spMkLst>
+            <pc:docMk/>
+            <pc:sldMk cId="815180451" sldId="258"/>
+            <ac:spMk id="9" creationId="{4E4490D0-3672-446A-AC12-B4830333BDDD}"/>
+          </ac:spMkLst>
+        </pc:spChg>
+        <pc:spChg chg="add del">
+          <ac:chgData name="Sheamus Clifford" userId="6289db22-700b-4bb7-828b-b7aee3de489c" providerId="ADAL" clId="{174DD396-4FC5-494D-B5F1-61C6B2F65D98}" dt="2021-01-03T23:43:41.569" v="48" actId="700"/>
+          <ac:spMkLst>
+            <pc:docMk/>
+            <pc:sldMk cId="815180451" sldId="258"/>
+            <ac:spMk id="10" creationId="{5CCC70ED-6C63-4537-B7EB-51990D6C0A6F}"/>
+          </ac:spMkLst>
+        </pc:spChg>
+        <pc:spChg chg="add del">
+          <ac:chgData name="Sheamus Clifford" userId="6289db22-700b-4bb7-828b-b7aee3de489c" providerId="ADAL" clId="{174DD396-4FC5-494D-B5F1-61C6B2F65D98}" dt="2021-01-03T23:45:14.967" v="63" actId="700"/>
+          <ac:spMkLst>
+            <pc:docMk/>
+            <pc:sldMk cId="815180451" sldId="258"/>
+            <ac:spMk id="11" creationId="{39CB82C2-DF65-4EC1-8280-F201D50F570B}"/>
+          </ac:spMkLst>
+        </pc:spChg>
+        <pc:spChg chg="add del">
+          <ac:chgData name="Sheamus Clifford" userId="6289db22-700b-4bb7-828b-b7aee3de489c" providerId="ADAL" clId="{174DD396-4FC5-494D-B5F1-61C6B2F65D98}" dt="2021-01-03T23:43:41.569" v="48" actId="700"/>
+          <ac:spMkLst>
+            <pc:docMk/>
+            <pc:sldMk cId="815180451" sldId="258"/>
+            <ac:spMk id="12" creationId="{B76E24C1-2968-40DC-A36E-F6B85F0F0752}"/>
+          </ac:spMkLst>
+        </pc:spChg>
+        <pc:spChg chg="add del">
+          <ac:chgData name="Sheamus Clifford" userId="6289db22-700b-4bb7-828b-b7aee3de489c" providerId="ADAL" clId="{174DD396-4FC5-494D-B5F1-61C6B2F65D98}" dt="2021-01-03T23:45:14.967" v="63" actId="700"/>
+          <ac:spMkLst>
+            <pc:docMk/>
+            <pc:sldMk cId="815180451" sldId="258"/>
+            <ac:spMk id="15" creationId="{FA4CD5CB-D209-4D70-8CA4-629731C59219}"/>
+          </ac:spMkLst>
+        </pc:spChg>
+        <pc:spChg chg="add del">
+          <ac:chgData name="Sheamus Clifford" userId="6289db22-700b-4bb7-828b-b7aee3de489c" providerId="ADAL" clId="{174DD396-4FC5-494D-B5F1-61C6B2F65D98}" dt="2021-01-03T23:45:14.967" v="63" actId="700"/>
+          <ac:spMkLst>
+            <pc:docMk/>
+            <pc:sldMk cId="815180451" sldId="258"/>
+            <ac:spMk id="19" creationId="{B4C27B90-DF2B-4D00-BA07-18ED774CD2F1}"/>
+          </ac:spMkLst>
+        </pc:spChg>
+        <pc:spChg chg="add del">
+          <ac:chgData name="Sheamus Clifford" userId="6289db22-700b-4bb7-828b-b7aee3de489c" providerId="ADAL" clId="{174DD396-4FC5-494D-B5F1-61C6B2F65D98}" dt="2021-01-03T23:45:14.967" v="63" actId="700"/>
+          <ac:spMkLst>
+            <pc:docMk/>
+            <pc:sldMk cId="815180451" sldId="258"/>
+            <ac:spMk id="21" creationId="{593ACC25-C262-417A-8AA9-0641C772BDB6}"/>
+          </ac:spMkLst>
+        </pc:spChg>
+        <pc:picChg chg="add mod ord">
+          <ac:chgData name="Sheamus Clifford" userId="6289db22-700b-4bb7-828b-b7aee3de489c" providerId="ADAL" clId="{174DD396-4FC5-494D-B5F1-61C6B2F65D98}" dt="2021-01-04T00:11:03.140" v="1921" actId="14100"/>
+          <ac:picMkLst>
+            <pc:docMk/>
+            <pc:sldMk cId="815180451" sldId="258"/>
+            <ac:picMk id="3" creationId="{EA3FBD85-29C4-4FDF-B677-34DE03FA28A2}"/>
+          </ac:picMkLst>
+        </pc:picChg>
+        <pc:cxnChg chg="add del">
+          <ac:chgData name="Sheamus Clifford" userId="6289db22-700b-4bb7-828b-b7aee3de489c" providerId="ADAL" clId="{174DD396-4FC5-494D-B5F1-61C6B2F65D98}" dt="2021-01-03T23:45:14.967" v="63" actId="700"/>
+          <ac:cxnSpMkLst>
+            <pc:docMk/>
+            <pc:sldMk cId="815180451" sldId="258"/>
+            <ac:cxnSpMk id="13" creationId="{7E1D4427-852B-4B37-8E76-0E9F1810BA2A}"/>
+          </ac:cxnSpMkLst>
+        </pc:cxnChg>
+        <pc:cxnChg chg="add del">
+          <ac:chgData name="Sheamus Clifford" userId="6289db22-700b-4bb7-828b-b7aee3de489c" providerId="ADAL" clId="{174DD396-4FC5-494D-B5F1-61C6B2F65D98}" dt="2021-01-03T23:45:14.967" v="63" actId="700"/>
+          <ac:cxnSpMkLst>
+            <pc:docMk/>
+            <pc:sldMk cId="815180451" sldId="258"/>
+            <ac:cxnSpMk id="17" creationId="{5C6A2BAE-B461-4B55-8E1F-0722ABDD1393}"/>
+          </ac:cxnSpMkLst>
+        </pc:cxnChg>
+      </pc:sldChg>
+      <pc:sldChg chg="addSp modSp new mod">
+        <pc:chgData name="Sheamus Clifford" userId="6289db22-700b-4bb7-828b-b7aee3de489c" providerId="ADAL" clId="{174DD396-4FC5-494D-B5F1-61C6B2F65D98}" dt="2021-01-04T00:08:10.877" v="1919" actId="20577"/>
+        <pc:sldMkLst>
+          <pc:docMk/>
+          <pc:sldMk cId="3310127049" sldId="259"/>
+        </pc:sldMkLst>
+        <pc:spChg chg="add mod">
+          <ac:chgData name="Sheamus Clifford" userId="6289db22-700b-4bb7-828b-b7aee3de489c" providerId="ADAL" clId="{174DD396-4FC5-494D-B5F1-61C6B2F65D98}" dt="2021-01-04T00:08:10.877" v="1919" actId="20577"/>
+          <ac:spMkLst>
+            <pc:docMk/>
+            <pc:sldMk cId="3310127049" sldId="259"/>
+            <ac:spMk id="2" creationId="{C79AC06E-BBB8-43EE-A8B9-E86F89D40745}"/>
+          </ac:spMkLst>
+        </pc:spChg>
       </pc:sldChg>
     </pc:docChg>
   </pc:docChgLst>
@@ -1186,7 +1366,7 @@
           <a:p>
             <a:fld id="{625BED58-34F0-42A1-90F9-9D2583C7D2A0}" type="datetimeFigureOut">
               <a:rPr lang="en-IE" smtClean="0"/>
-              <a:t>04/12/2020</a:t>
+              <a:t>03/01/2021</a:t>
             </a:fld>
             <a:endParaRPr lang="en-IE"/>
           </a:p>
@@ -1394,7 +1574,7 @@
           <a:p>
             <a:fld id="{625BED58-34F0-42A1-90F9-9D2583C7D2A0}" type="datetimeFigureOut">
               <a:rPr lang="en-IE" smtClean="0"/>
-              <a:t>04/12/2020</a:t>
+              <a:t>03/01/2021</a:t>
             </a:fld>
             <a:endParaRPr lang="en-IE"/>
           </a:p>
@@ -1650,7 +1830,7 @@
           <a:p>
             <a:fld id="{625BED58-34F0-42A1-90F9-9D2583C7D2A0}" type="datetimeFigureOut">
               <a:rPr lang="en-IE" smtClean="0"/>
-              <a:t>04/12/2020</a:t>
+              <a:t>03/01/2021</a:t>
             </a:fld>
             <a:endParaRPr lang="en-IE"/>
           </a:p>
@@ -1824,7 +2004,7 @@
           <a:p>
             <a:fld id="{625BED58-34F0-42A1-90F9-9D2583C7D2A0}" type="datetimeFigureOut">
               <a:rPr lang="en-IE" smtClean="0"/>
-              <a:t>04/12/2020</a:t>
+              <a:t>03/01/2021</a:t>
             </a:fld>
             <a:endParaRPr lang="en-IE"/>
           </a:p>
@@ -2167,7 +2347,7 @@
           <a:p>
             <a:fld id="{625BED58-34F0-42A1-90F9-9D2583C7D2A0}" type="datetimeFigureOut">
               <a:rPr lang="en-IE" smtClean="0"/>
-              <a:t>04/12/2020</a:t>
+              <a:t>03/01/2021</a:t>
             </a:fld>
             <a:endParaRPr lang="en-IE"/>
           </a:p>
@@ -2442,7 +2622,7 @@
           <a:p>
             <a:fld id="{625BED58-34F0-42A1-90F9-9D2583C7D2A0}" type="datetimeFigureOut">
               <a:rPr lang="en-IE" smtClean="0"/>
-              <a:t>04/12/2020</a:t>
+              <a:t>03/01/2021</a:t>
             </a:fld>
             <a:endParaRPr lang="en-IE"/>
           </a:p>
@@ -2821,7 +3001,7 @@
           <a:p>
             <a:fld id="{625BED58-34F0-42A1-90F9-9D2583C7D2A0}" type="datetimeFigureOut">
               <a:rPr lang="en-IE" smtClean="0"/>
-              <a:t>04/12/2020</a:t>
+              <a:t>03/01/2021</a:t>
             </a:fld>
             <a:endParaRPr lang="en-IE"/>
           </a:p>
@@ -2939,7 +3119,7 @@
           <a:p>
             <a:fld id="{625BED58-34F0-42A1-90F9-9D2583C7D2A0}" type="datetimeFigureOut">
               <a:rPr lang="en-IE" smtClean="0"/>
-              <a:t>04/12/2020</a:t>
+              <a:t>03/01/2021</a:t>
             </a:fld>
             <a:endParaRPr lang="en-IE"/>
           </a:p>
@@ -3110,7 +3290,7 @@
           <a:p>
             <a:fld id="{625BED58-34F0-42A1-90F9-9D2583C7D2A0}" type="datetimeFigureOut">
               <a:rPr lang="en-IE" smtClean="0"/>
-              <a:t>04/12/2020</a:t>
+              <a:t>03/01/2021</a:t>
             </a:fld>
             <a:endParaRPr lang="en-IE"/>
           </a:p>
@@ -3464,7 +3644,7 @@
           <a:p>
             <a:fld id="{625BED58-34F0-42A1-90F9-9D2583C7D2A0}" type="datetimeFigureOut">
               <a:rPr lang="en-IE" smtClean="0"/>
-              <a:t>04/12/2020</a:t>
+              <a:t>03/01/2021</a:t>
             </a:fld>
             <a:endParaRPr lang="en-IE"/>
           </a:p>
@@ -3846,7 +4026,7 @@
           <a:p>
             <a:fld id="{625BED58-34F0-42A1-90F9-9D2583C7D2A0}" type="datetimeFigureOut">
               <a:rPr lang="en-IE" smtClean="0"/>
-              <a:t>04/12/2020</a:t>
+              <a:t>03/01/2021</a:t>
             </a:fld>
             <a:endParaRPr lang="en-IE"/>
           </a:p>
@@ -4133,7 +4313,7 @@
           <a:p>
             <a:fld id="{625BED58-34F0-42A1-90F9-9D2583C7D2A0}" type="datetimeFigureOut">
               <a:rPr lang="en-IE" smtClean="0"/>
-              <a:t>04/12/2020</a:t>
+              <a:t>03/01/2021</a:t>
             </a:fld>
             <a:endParaRPr lang="en-IE"/>
           </a:p>
@@ -6191,6 +6371,178 @@
           </a:fontRef>
         </p:style>
       </p:cxnSp>
+      <p:sp>
+        <p:nvSpPr>
+          <p:cNvPr id="3" name="TextBox 2">
+            <a:extLst>
+              <a:ext uri="{FF2B5EF4-FFF2-40B4-BE49-F238E27FC236}">
+                <a16:creationId xmlns:a16="http://schemas.microsoft.com/office/drawing/2014/main" id="{B14197F2-E74F-4C0E-A3AF-45465A33C958}"/>
+              </a:ext>
+            </a:extLst>
+          </p:cNvPr>
+          <p:cNvSpPr txBox="1"/>
+          <p:nvPr/>
+        </p:nvSpPr>
+        <p:spPr>
+          <a:xfrm>
+            <a:off x="1841478" y="1281599"/>
+            <a:ext cx="1140227" cy="369332"/>
+          </a:xfrm>
+          <a:prstGeom prst="rect">
+            <a:avLst/>
+          </a:prstGeom>
+          <a:noFill/>
+          <a:ln>
+            <a:solidFill>
+              <a:schemeClr val="bg1">
+                <a:lumMod val="65000"/>
+              </a:schemeClr>
+            </a:solidFill>
+          </a:ln>
+        </p:spPr>
+        <p:txBody>
+          <a:bodyPr wrap="square" rtlCol="0">
+            <a:spAutoFit/>
+          </a:bodyPr>
+          <a:lstStyle/>
+          <a:p>
+            <a:pPr algn="ctr"/>
+            <a:r>
+              <a:rPr lang="en-IE" dirty="0"/>
+              <a:t>sensors</a:t>
+            </a:r>
+          </a:p>
+        </p:txBody>
+      </p:sp>
+      <p:sp>
+        <p:nvSpPr>
+          <p:cNvPr id="39" name="TextBox 38">
+            <a:extLst>
+              <a:ext uri="{FF2B5EF4-FFF2-40B4-BE49-F238E27FC236}">
+                <a16:creationId xmlns:a16="http://schemas.microsoft.com/office/drawing/2014/main" id="{9AA30EB3-AB26-423D-BFA8-5E91A1F18074}"/>
+              </a:ext>
+            </a:extLst>
+          </p:cNvPr>
+          <p:cNvSpPr txBox="1"/>
+          <p:nvPr/>
+        </p:nvSpPr>
+        <p:spPr>
+          <a:xfrm>
+            <a:off x="4064873" y="5722517"/>
+            <a:ext cx="1140227" cy="369332"/>
+          </a:xfrm>
+          <a:prstGeom prst="rect">
+            <a:avLst/>
+          </a:prstGeom>
+          <a:noFill/>
+          <a:ln>
+            <a:solidFill>
+              <a:schemeClr val="bg1">
+                <a:lumMod val="65000"/>
+              </a:schemeClr>
+            </a:solidFill>
+          </a:ln>
+        </p:spPr>
+        <p:txBody>
+          <a:bodyPr wrap="square" rtlCol="0">
+            <a:spAutoFit/>
+          </a:bodyPr>
+          <a:lstStyle/>
+          <a:p>
+            <a:pPr algn="ctr"/>
+            <a:r>
+              <a:rPr lang="en-IE" dirty="0"/>
+              <a:t>sensors</a:t>
+            </a:r>
+          </a:p>
+        </p:txBody>
+      </p:sp>
+      <p:sp>
+        <p:nvSpPr>
+          <p:cNvPr id="41" name="TextBox 40">
+            <a:extLst>
+              <a:ext uri="{FF2B5EF4-FFF2-40B4-BE49-F238E27FC236}">
+                <a16:creationId xmlns:a16="http://schemas.microsoft.com/office/drawing/2014/main" id="{2F7417B8-FEBE-4A32-8EF6-CCC2CC438B16}"/>
+              </a:ext>
+            </a:extLst>
+          </p:cNvPr>
+          <p:cNvSpPr txBox="1"/>
+          <p:nvPr/>
+        </p:nvSpPr>
+        <p:spPr>
+          <a:xfrm rot="16200000">
+            <a:off x="189879" y="3967007"/>
+            <a:ext cx="1942540" cy="369332"/>
+          </a:xfrm>
+          <a:prstGeom prst="rect">
+            <a:avLst/>
+          </a:prstGeom>
+          <a:noFill/>
+          <a:ln>
+            <a:solidFill>
+              <a:schemeClr val="bg1">
+                <a:lumMod val="65000"/>
+              </a:schemeClr>
+            </a:solidFill>
+          </a:ln>
+        </p:spPr>
+        <p:txBody>
+          <a:bodyPr wrap="square" rtlCol="0">
+            <a:spAutoFit/>
+          </a:bodyPr>
+          <a:lstStyle/>
+          <a:p>
+            <a:pPr algn="ctr"/>
+            <a:r>
+              <a:rPr lang="en-IE" dirty="0"/>
+              <a:t>Actuator outputs</a:t>
+            </a:r>
+          </a:p>
+        </p:txBody>
+      </p:sp>
+      <p:sp>
+        <p:nvSpPr>
+          <p:cNvPr id="42" name="TextBox 41">
+            <a:extLst>
+              <a:ext uri="{FF2B5EF4-FFF2-40B4-BE49-F238E27FC236}">
+                <a16:creationId xmlns:a16="http://schemas.microsoft.com/office/drawing/2014/main" id="{11782927-49BB-41A8-8277-319E76C972F5}"/>
+              </a:ext>
+            </a:extLst>
+          </p:cNvPr>
+          <p:cNvSpPr txBox="1"/>
+          <p:nvPr/>
+        </p:nvSpPr>
+        <p:spPr>
+          <a:xfrm>
+            <a:off x="4445910" y="1211020"/>
+            <a:ext cx="1140227" cy="369332"/>
+          </a:xfrm>
+          <a:prstGeom prst="rect">
+            <a:avLst/>
+          </a:prstGeom>
+          <a:noFill/>
+          <a:ln>
+            <a:solidFill>
+              <a:schemeClr val="bg1">
+                <a:lumMod val="65000"/>
+              </a:schemeClr>
+            </a:solidFill>
+          </a:ln>
+        </p:spPr>
+        <p:txBody>
+          <a:bodyPr wrap="square" rtlCol="0">
+            <a:spAutoFit/>
+          </a:bodyPr>
+          <a:lstStyle/>
+          <a:p>
+            <a:pPr algn="ctr"/>
+            <a:r>
+              <a:rPr lang="en-IE" dirty="0"/>
+              <a:t>display</a:t>
+            </a:r>
+          </a:p>
+        </p:txBody>
+      </p:sp>
     </p:spTree>
     <p:extLst>
       <p:ext uri="{BB962C8B-B14F-4D97-AF65-F5344CB8AC3E}">
@@ -7786,6 +8138,14 @@
 <file path=ppt/slides/slide3.xml><?xml version="1.0" encoding="utf-8"?>
 <p:sld xmlns:a="http://schemas.openxmlformats.org/drawingml/2006/main" xmlns:r="http://schemas.openxmlformats.org/officeDocument/2006/relationships" xmlns:p="http://schemas.openxmlformats.org/presentationml/2006/main">
   <p:cSld>
+    <p:bg>
+      <p:bgPr>
+        <a:solidFill>
+          <a:schemeClr val="bg1"/>
+        </a:solidFill>
+        <a:effectLst/>
+      </p:bgPr>
+    </p:bg>
     <p:spTree>
       <p:nvGrpSpPr>
         <p:cNvPr id="1" name=""/>
@@ -7800,10 +8160,224 @@
           <a:chExt cx="0" cy="0"/>
         </a:xfrm>
       </p:grpSpPr>
+      <p:pic>
+        <p:nvPicPr>
+          <p:cNvPr id="3" name="Picture 2">
+            <a:extLst>
+              <a:ext uri="{FF2B5EF4-FFF2-40B4-BE49-F238E27FC236}">
+                <a16:creationId xmlns:a16="http://schemas.microsoft.com/office/drawing/2014/main" id="{EA3FBD85-29C4-4FDF-B677-34DE03FA28A2}"/>
+              </a:ext>
+            </a:extLst>
+          </p:cNvPr>
+          <p:cNvPicPr>
+            <a:picLocks noChangeAspect="1"/>
+          </p:cNvPicPr>
+          <p:nvPr/>
+        </p:nvPicPr>
+        <p:blipFill>
+          <a:blip r:embed="rId2">
+            <a:extLst>
+              <a:ext uri="{28A0092B-C50C-407E-A947-70E740481C1C}">
+                <a14:useLocalDpi xmlns:a14="http://schemas.microsoft.com/office/drawing/2010/main" val="0"/>
+              </a:ext>
+            </a:extLst>
+          </a:blip>
+          <a:srcRect/>
+          <a:stretch/>
+        </p:blipFill>
+        <p:spPr>
+          <a:xfrm>
+            <a:off x="2140819" y="369332"/>
+            <a:ext cx="7678426" cy="5939915"/>
+          </a:xfrm>
+          <a:prstGeom prst="rect">
+            <a:avLst/>
+          </a:prstGeom>
+        </p:spPr>
+      </p:pic>
+      <p:sp>
+        <p:nvSpPr>
+          <p:cNvPr id="5" name="TextBox 4">
+            <a:extLst>
+              <a:ext uri="{FF2B5EF4-FFF2-40B4-BE49-F238E27FC236}">
+                <a16:creationId xmlns:a16="http://schemas.microsoft.com/office/drawing/2014/main" id="{83D44ECC-0ACB-45BE-A674-A70550987B71}"/>
+              </a:ext>
+            </a:extLst>
+          </p:cNvPr>
+          <p:cNvSpPr txBox="1"/>
+          <p:nvPr/>
+        </p:nvSpPr>
+        <p:spPr>
+          <a:xfrm>
+            <a:off x="1435359" y="0"/>
+            <a:ext cx="9321281" cy="369332"/>
+          </a:xfrm>
+          <a:prstGeom prst="rect">
+            <a:avLst/>
+          </a:prstGeom>
+          <a:noFill/>
+        </p:spPr>
+        <p:txBody>
+          <a:bodyPr wrap="square" rtlCol="0">
+            <a:spAutoFit/>
+          </a:bodyPr>
+          <a:lstStyle/>
+          <a:p>
+            <a:pPr algn="ctr"/>
+            <a:r>
+              <a:rPr lang="en-IE" dirty="0"/>
+              <a:t>Process physical layout and sensor and switched output locations</a:t>
+            </a:r>
+          </a:p>
+        </p:txBody>
+      </p:sp>
     </p:spTree>
     <p:extLst>
       <p:ext uri="{BB962C8B-B14F-4D97-AF65-F5344CB8AC3E}">
         <p14:creationId xmlns:p14="http://schemas.microsoft.com/office/powerpoint/2010/main" val="815180451"/>
+      </p:ext>
+    </p:extLst>
+  </p:cSld>
+  <p:clrMapOvr>
+    <a:masterClrMapping/>
+  </p:clrMapOvr>
+</p:sld>
+</file>
+
+<file path=ppt/slides/slide4.xml><?xml version="1.0" encoding="utf-8"?>
+<p:sld xmlns:a="http://schemas.openxmlformats.org/drawingml/2006/main" xmlns:r="http://schemas.openxmlformats.org/officeDocument/2006/relationships" xmlns:p="http://schemas.openxmlformats.org/presentationml/2006/main">
+  <p:cSld>
+    <p:spTree>
+      <p:nvGrpSpPr>
+        <p:cNvPr id="1" name=""/>
+        <p:cNvGrpSpPr/>
+        <p:nvPr/>
+      </p:nvGrpSpPr>
+      <p:grpSpPr>
+        <a:xfrm>
+          <a:off x="0" y="0"/>
+          <a:ext cx="0" cy="0"/>
+          <a:chOff x="0" y="0"/>
+          <a:chExt cx="0" cy="0"/>
+        </a:xfrm>
+      </p:grpSpPr>
+      <p:sp>
+        <p:nvSpPr>
+          <p:cNvPr id="2" name="TextBox 1">
+            <a:extLst>
+              <a:ext uri="{FF2B5EF4-FFF2-40B4-BE49-F238E27FC236}">
+                <a16:creationId xmlns:a16="http://schemas.microsoft.com/office/drawing/2014/main" id="{C79AC06E-BBB8-43EE-A8B9-E86F89D40745}"/>
+              </a:ext>
+            </a:extLst>
+          </p:cNvPr>
+          <p:cNvSpPr txBox="1"/>
+          <p:nvPr/>
+        </p:nvSpPr>
+        <p:spPr>
+          <a:xfrm>
+            <a:off x="465513" y="349135"/>
+            <a:ext cx="11321934" cy="5078313"/>
+          </a:xfrm>
+          <a:prstGeom prst="rect">
+            <a:avLst/>
+          </a:prstGeom>
+          <a:noFill/>
+        </p:spPr>
+        <p:txBody>
+          <a:bodyPr wrap="square" rtlCol="0">
+            <a:spAutoFit/>
+          </a:bodyPr>
+          <a:lstStyle/>
+          <a:p>
+            <a:pPr marL="342900" indent="-342900">
+              <a:buFont typeface="+mj-lt"/>
+              <a:buAutoNum type="arabicPeriod"/>
+            </a:pPr>
+            <a:r>
+              <a:rPr lang="en-IE" dirty="0"/>
+              <a:t>The heating control system has been created on an Arduino Uno. This controller receives sensor values and actuates process pumps valves and fans through relays.</a:t>
+            </a:r>
+          </a:p>
+          <a:p>
+            <a:pPr marL="342900" indent="-342900">
+              <a:buFont typeface="+mj-lt"/>
+              <a:buAutoNum type="arabicPeriod"/>
+            </a:pPr>
+            <a:r>
+              <a:rPr lang="en-IE" dirty="0"/>
+              <a:t>A raspberry Pi controls communication, receives sensor values and states from control Arduino and sends data via MQTT to a local server to store data. Raspberry Pi also syncs data with Blynk app for easy monitoring and switching of process controls remotely. Raspberry Pi also sends external control signals back down to control Arduino via serial connection based on remote inputs from Blynk app.</a:t>
+            </a:r>
+          </a:p>
+          <a:p>
+            <a:pPr marL="342900" indent="-342900">
+              <a:buFont typeface="+mj-lt"/>
+              <a:buAutoNum type="arabicPeriod"/>
+            </a:pPr>
+            <a:r>
+              <a:rPr lang="en-IE" dirty="0"/>
+              <a:t>Remote server receives data from Raspberry Pi at remote location and stores data to </a:t>
+            </a:r>
+            <a:r>
+              <a:rPr lang="en-IE" dirty="0" err="1"/>
+              <a:t>MySql</a:t>
+            </a:r>
+            <a:r>
+              <a:rPr lang="en-IE" dirty="0"/>
+              <a:t> server for future analysis. Server also sends data to </a:t>
+            </a:r>
+            <a:r>
+              <a:rPr lang="en-IE" dirty="0" err="1"/>
+              <a:t>thingspeak</a:t>
+            </a:r>
+            <a:r>
+              <a:rPr lang="en-IE" dirty="0"/>
+              <a:t> for remote storage and monitoring if required.</a:t>
+            </a:r>
+          </a:p>
+          <a:p>
+            <a:pPr marL="342900" indent="-342900">
+              <a:buFont typeface="+mj-lt"/>
+              <a:buAutoNum type="arabicPeriod"/>
+            </a:pPr>
+            <a:r>
+              <a:rPr lang="en-IE" dirty="0" err="1"/>
+              <a:t>Thingspeak</a:t>
+            </a:r>
+            <a:r>
+              <a:rPr lang="en-IE" dirty="0"/>
+              <a:t> has a React set up to send a tweet if data has not been received for more than 60 mins, this will alert user that the system is offline and not sending data. Also a react is sent if the temperature of the buffer tank drops below 60 degrees, so user can light gasification boiler in time to get up to heat to prevent system switching over to oil fired heating.</a:t>
+            </a:r>
+          </a:p>
+          <a:p>
+            <a:pPr marL="342900" indent="-342900">
+              <a:buFont typeface="+mj-lt"/>
+              <a:buAutoNum type="arabicPeriod"/>
+            </a:pPr>
+            <a:r>
+              <a:rPr lang="en-IE" dirty="0"/>
+              <a:t>Blynk app displays critical values to user, has a notification set to alert user if temperature of the buffer tank drops below a threshold in order for user to light fire for gasification boiler. Also a notification to notify user if hardware goes offline to signal communication issues with Raspberry Pi or other problems which may cause communication loss i.e. power loss, network loss or hardware failure.</a:t>
+            </a:r>
+          </a:p>
+          <a:p>
+            <a:pPr marL="342900" indent="-342900">
+              <a:buFont typeface="+mj-lt"/>
+              <a:buAutoNum type="arabicPeriod"/>
+            </a:pPr>
+            <a:endParaRPr lang="en-IE" dirty="0"/>
+          </a:p>
+          <a:p>
+            <a:pPr marL="342900" indent="-342900">
+              <a:buFont typeface="+mj-lt"/>
+              <a:buAutoNum type="arabicPeriod"/>
+            </a:pPr>
+            <a:endParaRPr lang="en-IE" dirty="0"/>
+          </a:p>
+        </p:txBody>
+      </p:sp>
+    </p:spTree>
+    <p:extLst>
+      <p:ext uri="{BB962C8B-B14F-4D97-AF65-F5344CB8AC3E}">
+        <p14:creationId xmlns:p14="http://schemas.microsoft.com/office/powerpoint/2010/main" val="3310127049"/>
       </p:ext>
     </p:extLst>
   </p:cSld>

</xml_diff>